<commit_message>
updated to version 0.4 as per Richard's feedback
</commit_message>
<xml_diff>
--- a/Workshop Guide/Squared Up VSAE Workshop.pptx
+++ b/Workshop Guide/Squared Up VSAE Workshop.pptx
@@ -221,7 +221,7 @@
           <a:p>
             <a:fld id="{8CFCCC53-742D-4B25-A820-BE94116A3139}" type="datetimeFigureOut">
               <a:rPr lang="en-GB" smtClean="0"/>
-              <a:t>05/04/2016</a:t>
+              <a:t>11/04/2016</a:t>
             </a:fld>
             <a:endParaRPr lang="en-GB"/>
           </a:p>
@@ -386,7 +386,7 @@
           <a:p>
             <a:fld id="{CA7E617A-BB93-43A2-B5C5-FA674CDA666F}" type="datetimeFigureOut">
               <a:rPr lang="en-GB" smtClean="0"/>
-              <a:t>05/04/2016</a:t>
+              <a:t>11/04/2016</a:t>
             </a:fld>
             <a:endParaRPr lang="en-GB"/>
           </a:p>
@@ -785,7 +785,7 @@
           <a:p>
             <a:fld id="{B681361A-F8BC-4BE9-B009-3AAFD826EDB0}" type="datetimeFigureOut">
               <a:rPr lang="en-GB" smtClean="0"/>
-              <a:t>05/04/2016</a:t>
+              <a:t>11/04/2016</a:t>
             </a:fld>
             <a:endParaRPr lang="en-GB"/>
           </a:p>
@@ -963,7 +963,7 @@
           <a:p>
             <a:fld id="{B681361A-F8BC-4BE9-B009-3AAFD826EDB0}" type="datetimeFigureOut">
               <a:rPr lang="en-GB" smtClean="0"/>
-              <a:t>05/04/2016</a:t>
+              <a:t>11/04/2016</a:t>
             </a:fld>
             <a:endParaRPr lang="en-GB"/>
           </a:p>
@@ -1151,7 +1151,7 @@
           <a:p>
             <a:fld id="{B681361A-F8BC-4BE9-B009-3AAFD826EDB0}" type="datetimeFigureOut">
               <a:rPr lang="en-GB" smtClean="0"/>
-              <a:t>05/04/2016</a:t>
+              <a:t>11/04/2016</a:t>
             </a:fld>
             <a:endParaRPr lang="en-GB"/>
           </a:p>
@@ -1329,7 +1329,7 @@
           <a:p>
             <a:fld id="{B681361A-F8BC-4BE9-B009-3AAFD826EDB0}" type="datetimeFigureOut">
               <a:rPr lang="en-GB" smtClean="0"/>
-              <a:t>05/04/2016</a:t>
+              <a:t>11/04/2016</a:t>
             </a:fld>
             <a:endParaRPr lang="en-GB"/>
           </a:p>
@@ -1583,7 +1583,7 @@
           <a:p>
             <a:fld id="{B681361A-F8BC-4BE9-B009-3AAFD826EDB0}" type="datetimeFigureOut">
               <a:rPr lang="en-GB" smtClean="0"/>
-              <a:t>05/04/2016</a:t>
+              <a:t>11/04/2016</a:t>
             </a:fld>
             <a:endParaRPr lang="en-GB"/>
           </a:p>
@@ -1823,7 +1823,7 @@
           <a:p>
             <a:fld id="{B681361A-F8BC-4BE9-B009-3AAFD826EDB0}" type="datetimeFigureOut">
               <a:rPr lang="en-GB" smtClean="0"/>
-              <a:t>05/04/2016</a:t>
+              <a:t>11/04/2016</a:t>
             </a:fld>
             <a:endParaRPr lang="en-GB"/>
           </a:p>
@@ -2198,7 +2198,7 @@
           <a:p>
             <a:fld id="{B681361A-F8BC-4BE9-B009-3AAFD826EDB0}" type="datetimeFigureOut">
               <a:rPr lang="en-GB" smtClean="0"/>
-              <a:t>05/04/2016</a:t>
+              <a:t>11/04/2016</a:t>
             </a:fld>
             <a:endParaRPr lang="en-GB"/>
           </a:p>
@@ -2324,7 +2324,7 @@
           <a:p>
             <a:fld id="{B681361A-F8BC-4BE9-B009-3AAFD826EDB0}" type="datetimeFigureOut">
               <a:rPr lang="en-GB" smtClean="0"/>
-              <a:t>05/04/2016</a:t>
+              <a:t>11/04/2016</a:t>
             </a:fld>
             <a:endParaRPr lang="en-GB"/>
           </a:p>
@@ -2427,7 +2427,7 @@
           <a:p>
             <a:fld id="{B681361A-F8BC-4BE9-B009-3AAFD826EDB0}" type="datetimeFigureOut">
               <a:rPr lang="en-GB" smtClean="0"/>
-              <a:t>05/04/2016</a:t>
+              <a:t>11/04/2016</a:t>
             </a:fld>
             <a:endParaRPr lang="en-GB"/>
           </a:p>
@@ -2712,7 +2712,7 @@
           <a:p>
             <a:fld id="{B681361A-F8BC-4BE9-B009-3AAFD826EDB0}" type="datetimeFigureOut">
               <a:rPr lang="en-GB" smtClean="0"/>
-              <a:t>05/04/2016</a:t>
+              <a:t>11/04/2016</a:t>
             </a:fld>
             <a:endParaRPr lang="en-GB"/>
           </a:p>
@@ -2977,7 +2977,7 @@
           <a:p>
             <a:fld id="{B681361A-F8BC-4BE9-B009-3AAFD826EDB0}" type="datetimeFigureOut">
               <a:rPr lang="en-GB" smtClean="0"/>
-              <a:t>05/04/2016</a:t>
+              <a:t>11/04/2016</a:t>
             </a:fld>
             <a:endParaRPr lang="en-GB"/>
           </a:p>
@@ -3198,7 +3198,7 @@
           <a:p>
             <a:fld id="{B681361A-F8BC-4BE9-B009-3AAFD826EDB0}" type="datetimeFigureOut">
               <a:rPr lang="en-GB" smtClean="0"/>
-              <a:t>05/04/2016</a:t>
+              <a:t>11/04/2016</a:t>
             </a:fld>
             <a:endParaRPr lang="en-GB"/>
           </a:p>
@@ -3701,16 +3701,16 @@
                 </a:solidFill>
                 <a:latin typeface="Raleway" panose="020B0503030101060003" pitchFamily="34" charset="0"/>
               </a:rPr>
-              <a:t>Workshop: Authoring OpsMgr Agent Tasks using Visual Studio Authoring </a:t>
-            </a:r>
-            <a:r>
-              <a:rPr lang="en-US" sz="3600" b="1" dirty="0" err="1">
+              <a:t>Workshop: Authoring OpsMgr Agent Tasks using Visual Studio </a:t>
+            </a:r>
+            <a:r>
+              <a:rPr lang="en-US" sz="3600" b="1">
                 <a:solidFill>
                   <a:srgbClr val="102A47"/>
                 </a:solidFill>
                 <a:latin typeface="Raleway" panose="020B0503030101060003" pitchFamily="34" charset="0"/>
               </a:rPr>
-              <a:t>Extention</a:t>
+              <a:t>Authoring Extension</a:t>
             </a:r>
             <a:endParaRPr lang="en-US" sz="3600" b="1" dirty="0">
               <a:solidFill>

</xml_diff>

<commit_message>
updated the slide deck with additional material slide
</commit_message>
<xml_diff>
--- a/Workshop Guide/Squared Up VSAE Workshop.pptx
+++ b/Workshop Guide/Squared Up VSAE Workshop.pptx
@@ -5,10 +5,10 @@
     <p:sldMasterId id="2147483708" r:id="rId1"/>
   </p:sldMasterIdLst>
   <p:notesMasterIdLst>
-    <p:notesMasterId r:id="rId9"/>
+    <p:notesMasterId r:id="rId10"/>
   </p:notesMasterIdLst>
   <p:handoutMasterIdLst>
-    <p:handoutMasterId r:id="rId10"/>
+    <p:handoutMasterId r:id="rId11"/>
   </p:handoutMasterIdLst>
   <p:sldIdLst>
     <p:sldId id="406" r:id="rId2"/>
@@ -17,7 +17,8 @@
     <p:sldId id="450" r:id="rId5"/>
     <p:sldId id="456" r:id="rId6"/>
     <p:sldId id="451" r:id="rId7"/>
-    <p:sldId id="452" r:id="rId8"/>
+    <p:sldId id="457" r:id="rId8"/>
+    <p:sldId id="452" r:id="rId9"/>
   </p:sldIdLst>
   <p:sldSz cx="12192000" cy="6858000"/>
   <p:notesSz cx="6858000" cy="9144000"/>
@@ -221,7 +222,7 @@
           <a:p>
             <a:fld id="{8CFCCC53-742D-4B25-A820-BE94116A3139}" type="datetimeFigureOut">
               <a:rPr lang="en-GB" smtClean="0"/>
-              <a:t>14/04/2016</a:t>
+              <a:t>28/04/2016</a:t>
             </a:fld>
             <a:endParaRPr lang="en-GB"/>
           </a:p>
@@ -386,7 +387,7 @@
           <a:p>
             <a:fld id="{CA7E617A-BB93-43A2-B5C5-FA674CDA666F}" type="datetimeFigureOut">
               <a:rPr lang="en-GB" smtClean="0"/>
-              <a:t>14/04/2016</a:t>
+              <a:t>28/04/2016</a:t>
             </a:fld>
             <a:endParaRPr lang="en-GB"/>
           </a:p>
@@ -785,7 +786,7 @@
           <a:p>
             <a:fld id="{B681361A-F8BC-4BE9-B009-3AAFD826EDB0}" type="datetimeFigureOut">
               <a:rPr lang="en-GB" smtClean="0"/>
-              <a:t>14/04/2016</a:t>
+              <a:t>28/04/2016</a:t>
             </a:fld>
             <a:endParaRPr lang="en-GB"/>
           </a:p>
@@ -963,7 +964,7 @@
           <a:p>
             <a:fld id="{B681361A-F8BC-4BE9-B009-3AAFD826EDB0}" type="datetimeFigureOut">
               <a:rPr lang="en-GB" smtClean="0"/>
-              <a:t>14/04/2016</a:t>
+              <a:t>28/04/2016</a:t>
             </a:fld>
             <a:endParaRPr lang="en-GB"/>
           </a:p>
@@ -1151,7 +1152,7 @@
           <a:p>
             <a:fld id="{B681361A-F8BC-4BE9-B009-3AAFD826EDB0}" type="datetimeFigureOut">
               <a:rPr lang="en-GB" smtClean="0"/>
-              <a:t>14/04/2016</a:t>
+              <a:t>28/04/2016</a:t>
             </a:fld>
             <a:endParaRPr lang="en-GB"/>
           </a:p>
@@ -1329,7 +1330,7 @@
           <a:p>
             <a:fld id="{B681361A-F8BC-4BE9-B009-3AAFD826EDB0}" type="datetimeFigureOut">
               <a:rPr lang="en-GB" smtClean="0"/>
-              <a:t>14/04/2016</a:t>
+              <a:t>28/04/2016</a:t>
             </a:fld>
             <a:endParaRPr lang="en-GB"/>
           </a:p>
@@ -1583,7 +1584,7 @@
           <a:p>
             <a:fld id="{B681361A-F8BC-4BE9-B009-3AAFD826EDB0}" type="datetimeFigureOut">
               <a:rPr lang="en-GB" smtClean="0"/>
-              <a:t>14/04/2016</a:t>
+              <a:t>28/04/2016</a:t>
             </a:fld>
             <a:endParaRPr lang="en-GB"/>
           </a:p>
@@ -1823,7 +1824,7 @@
           <a:p>
             <a:fld id="{B681361A-F8BC-4BE9-B009-3AAFD826EDB0}" type="datetimeFigureOut">
               <a:rPr lang="en-GB" smtClean="0"/>
-              <a:t>14/04/2016</a:t>
+              <a:t>28/04/2016</a:t>
             </a:fld>
             <a:endParaRPr lang="en-GB"/>
           </a:p>
@@ -2198,7 +2199,7 @@
           <a:p>
             <a:fld id="{B681361A-F8BC-4BE9-B009-3AAFD826EDB0}" type="datetimeFigureOut">
               <a:rPr lang="en-GB" smtClean="0"/>
-              <a:t>14/04/2016</a:t>
+              <a:t>28/04/2016</a:t>
             </a:fld>
             <a:endParaRPr lang="en-GB"/>
           </a:p>
@@ -2324,7 +2325,7 @@
           <a:p>
             <a:fld id="{B681361A-F8BC-4BE9-B009-3AAFD826EDB0}" type="datetimeFigureOut">
               <a:rPr lang="en-GB" smtClean="0"/>
-              <a:t>14/04/2016</a:t>
+              <a:t>28/04/2016</a:t>
             </a:fld>
             <a:endParaRPr lang="en-GB"/>
           </a:p>
@@ -2427,7 +2428,7 @@
           <a:p>
             <a:fld id="{B681361A-F8BC-4BE9-B009-3AAFD826EDB0}" type="datetimeFigureOut">
               <a:rPr lang="en-GB" smtClean="0"/>
-              <a:t>14/04/2016</a:t>
+              <a:t>28/04/2016</a:t>
             </a:fld>
             <a:endParaRPr lang="en-GB"/>
           </a:p>
@@ -2712,7 +2713,7 @@
           <a:p>
             <a:fld id="{B681361A-F8BC-4BE9-B009-3AAFD826EDB0}" type="datetimeFigureOut">
               <a:rPr lang="en-GB" smtClean="0"/>
-              <a:t>14/04/2016</a:t>
+              <a:t>28/04/2016</a:t>
             </a:fld>
             <a:endParaRPr lang="en-GB"/>
           </a:p>
@@ -2977,7 +2978,7 @@
           <a:p>
             <a:fld id="{B681361A-F8BC-4BE9-B009-3AAFD826EDB0}" type="datetimeFigureOut">
               <a:rPr lang="en-GB" smtClean="0"/>
-              <a:t>14/04/2016</a:t>
+              <a:t>28/04/2016</a:t>
             </a:fld>
             <a:endParaRPr lang="en-GB"/>
           </a:p>
@@ -3198,7 +3199,7 @@
           <a:p>
             <a:fld id="{B681361A-F8BC-4BE9-B009-3AAFD826EDB0}" type="datetimeFigureOut">
               <a:rPr lang="en-GB" smtClean="0"/>
-              <a:t>14/04/2016</a:t>
+              <a:t>28/04/2016</a:t>
             </a:fld>
             <a:endParaRPr lang="en-GB"/>
           </a:p>
@@ -5009,17 +5010,7 @@
                 <a:latin typeface="Raleway" panose="020B0503030101060003" pitchFamily="34" charset="0"/>
                 <a:hlinkClick r:id="rId2"/>
               </a:rPr>
-              <a:t>http</a:t>
-            </a:r>
-            <a:r>
-              <a:rPr lang="en-GB" sz="2800">
-                <a:solidFill>
-                  <a:prstClr val="white"/>
-                </a:solidFill>
-                <a:latin typeface="Raleway" panose="020B0503030101060003" pitchFamily="34" charset="0"/>
-                <a:hlinkClick r:id="rId2"/>
-              </a:rPr>
-              <a:t>://tiny.cc/u0xsay</a:t>
+              <a:t>http://tiny.cc/u0xsay</a:t>
             </a:r>
             <a:r>
               <a:rPr lang="en-GB" sz="2800">
@@ -5261,6 +5252,216 @@
 </file>
 
 <file path=ppt/slides/slide7.xml><?xml version="1.0" encoding="utf-8"?>
+<p:sld xmlns:a="http://schemas.openxmlformats.org/drawingml/2006/main" xmlns:r="http://schemas.openxmlformats.org/officeDocument/2006/relationships" xmlns:p="http://schemas.openxmlformats.org/presentationml/2006/main">
+  <p:cSld>
+    <p:bg>
+      <p:bgPr>
+        <a:solidFill>
+          <a:srgbClr val="102A47"/>
+        </a:solidFill>
+        <a:effectLst/>
+      </p:bgPr>
+    </p:bg>
+    <p:spTree>
+      <p:nvGrpSpPr>
+        <p:cNvPr id="1" name=""/>
+        <p:cNvGrpSpPr/>
+        <p:nvPr/>
+      </p:nvGrpSpPr>
+      <p:grpSpPr>
+        <a:xfrm>
+          <a:off x="0" y="0"/>
+          <a:ext cx="0" cy="0"/>
+          <a:chOff x="0" y="0"/>
+          <a:chExt cx="0" cy="0"/>
+        </a:xfrm>
+      </p:grpSpPr>
+      <p:sp>
+        <p:nvSpPr>
+          <p:cNvPr id="10" name="TextBox 9"/>
+          <p:cNvSpPr txBox="1"/>
+          <p:nvPr/>
+        </p:nvSpPr>
+        <p:spPr>
+          <a:xfrm>
+            <a:off x="774357" y="1623847"/>
+            <a:ext cx="9760294" cy="2585323"/>
+          </a:xfrm>
+          <a:prstGeom prst="rect">
+            <a:avLst/>
+          </a:prstGeom>
+          <a:noFill/>
+        </p:spPr>
+        <p:txBody>
+          <a:bodyPr wrap="square" rtlCol="0">
+            <a:spAutoFit/>
+          </a:bodyPr>
+          <a:lstStyle/>
+          <a:p>
+            <a:pPr marL="457200" indent="-457200">
+              <a:lnSpc>
+                <a:spcPct val="150000"/>
+              </a:lnSpc>
+              <a:buFont typeface="Wingdings" panose="05000000000000000000" pitchFamily="2" charset="2"/>
+              <a:buChar char="§"/>
+            </a:pPr>
+            <a:r>
+              <a:rPr lang="en-GB" sz="2800" dirty="0">
+                <a:solidFill>
+                  <a:prstClr val="white"/>
+                </a:solidFill>
+                <a:latin typeface="Raleway" panose="020B0503030101060003" pitchFamily="34" charset="0"/>
+              </a:rPr>
+              <a:t>MP Authoring MVA Course</a:t>
+            </a:r>
+            <a:r>
+              <a:rPr lang="en-GB" sz="2800">
+                <a:solidFill>
+                  <a:prstClr val="white"/>
+                </a:solidFill>
+                <a:latin typeface="Raleway" panose="020B0503030101060003" pitchFamily="34" charset="0"/>
+              </a:rPr>
+              <a:t>: </a:t>
+            </a:r>
+            <a:r>
+              <a:rPr lang="en-GB" sz="2800">
+                <a:solidFill>
+                  <a:prstClr val="white"/>
+                </a:solidFill>
+                <a:latin typeface="Raleway" panose="020B0503030101060003" pitchFamily="34" charset="0"/>
+                <a:hlinkClick r:id="rId2"/>
+              </a:rPr>
+              <a:t>https</a:t>
+            </a:r>
+            <a:r>
+              <a:rPr lang="en-GB" sz="2800">
+                <a:solidFill>
+                  <a:prstClr val="white"/>
+                </a:solidFill>
+                <a:latin typeface="Raleway" panose="020B0503030101060003" pitchFamily="34" charset="0"/>
+                <a:hlinkClick r:id="rId2"/>
+              </a:rPr>
+              <a:t>://mva.microsoft.com/en-US/training-courses/system-center-2012-r2-operations-manager-management-pack-8829</a:t>
+            </a:r>
+            <a:r>
+              <a:rPr lang="en-GB" sz="2800">
+                <a:solidFill>
+                  <a:prstClr val="white"/>
+                </a:solidFill>
+                <a:latin typeface="Raleway" panose="020B0503030101060003" pitchFamily="34" charset="0"/>
+              </a:rPr>
+              <a:t> </a:t>
+            </a:r>
+            <a:endParaRPr lang="en-GB" sz="2400" dirty="0">
+              <a:solidFill>
+                <a:prstClr val="white"/>
+              </a:solidFill>
+              <a:latin typeface="Raleway" panose="020B0503030101060003" pitchFamily="34" charset="0"/>
+            </a:endParaRPr>
+          </a:p>
+          <a:p>
+            <a:pPr marL="457200" indent="-457200">
+              <a:lnSpc>
+                <a:spcPct val="150000"/>
+              </a:lnSpc>
+              <a:buFont typeface="Wingdings" panose="05000000000000000000" pitchFamily="2" charset="2"/>
+              <a:buChar char="§"/>
+            </a:pPr>
+            <a:endParaRPr lang="en-GB" sz="2400" dirty="0">
+              <a:solidFill>
+                <a:prstClr val="white"/>
+              </a:solidFill>
+              <a:latin typeface="Raleway" panose="020B0503030101060003" pitchFamily="34" charset="0"/>
+            </a:endParaRPr>
+          </a:p>
+        </p:txBody>
+      </p:sp>
+      <p:sp>
+        <p:nvSpPr>
+          <p:cNvPr id="5" name="Title 3"/>
+          <p:cNvSpPr txBox="1">
+            <a:spLocks/>
+          </p:cNvSpPr>
+          <p:nvPr/>
+        </p:nvSpPr>
+        <p:spPr>
+          <a:xfrm>
+            <a:off x="774357" y="217715"/>
+            <a:ext cx="8627272" cy="1038754"/>
+          </a:xfrm>
+          <a:prstGeom prst="rect">
+            <a:avLst/>
+          </a:prstGeom>
+        </p:spPr>
+        <p:txBody>
+          <a:bodyPr vert="horz" lIns="91440" tIns="45720" rIns="91440" bIns="45720" rtlCol="0" anchor="b">
+            <a:normAutofit fontScale="92500" lnSpcReduction="20000"/>
+          </a:bodyPr>
+          <a:lstStyle>
+            <a:lvl1pPr algn="ctr" defTabSz="914400" rtl="0" eaLnBrk="1" latinLnBrk="0" hangingPunct="1">
+              <a:lnSpc>
+                <a:spcPct val="90000"/>
+              </a:lnSpc>
+              <a:spcBef>
+                <a:spcPct val="0"/>
+              </a:spcBef>
+              <a:buNone/>
+              <a:defRPr sz="6000" kern="1200">
+                <a:solidFill>
+                  <a:schemeClr val="tx1"/>
+                </a:solidFill>
+                <a:latin typeface="+mj-lt"/>
+                <a:ea typeface="+mj-ea"/>
+                <a:cs typeface="+mj-cs"/>
+              </a:defRPr>
+            </a:lvl1pPr>
+          </a:lstStyle>
+          <a:p>
+            <a:pPr algn="l"/>
+            <a:r>
+              <a:rPr lang="en-US" sz="8800" dirty="0">
+                <a:solidFill>
+                  <a:srgbClr val="F29D2F"/>
+                </a:solidFill>
+                <a:latin typeface="Raleway" panose="020B0503030101060003" pitchFamily="34" charset="0"/>
+              </a:rPr>
+              <a:t>Additional Material</a:t>
+            </a:r>
+            <a:endParaRPr lang="en-US" sz="6600" dirty="0">
+              <a:solidFill>
+                <a:srgbClr val="F29D2F"/>
+              </a:solidFill>
+              <a:latin typeface="Raleway" panose="020B0503030101060003" pitchFamily="34" charset="0"/>
+            </a:endParaRPr>
+          </a:p>
+        </p:txBody>
+      </p:sp>
+    </p:spTree>
+    <p:extLst>
+      <p:ext uri="{BB962C8B-B14F-4D97-AF65-F5344CB8AC3E}">
+        <p14:creationId xmlns:p14="http://schemas.microsoft.com/office/powerpoint/2010/main" val="3502231475"/>
+      </p:ext>
+    </p:extLst>
+  </p:cSld>
+  <p:clrMapOvr>
+    <a:masterClrMapping/>
+  </p:clrMapOvr>
+  <mc:AlternateContent xmlns:mc="http://schemas.openxmlformats.org/markup-compatibility/2006" xmlns:p14="http://schemas.microsoft.com/office/powerpoint/2010/main">
+    <mc:Choice Requires="p14">
+      <p:transition spd="slow" p14:dur="1500">
+        <p:fade/>
+      </p:transition>
+    </mc:Choice>
+    <mc:Fallback xmlns="">
+      <p:transition spd="slow">
+        <p:fade/>
+      </p:transition>
+    </mc:Fallback>
+  </mc:AlternateContent>
+</p:sld>
+</file>
+
+<file path=ppt/slides/slide8.xml><?xml version="1.0" encoding="utf-8"?>
 <p:sld xmlns:a="http://schemas.openxmlformats.org/drawingml/2006/main" xmlns:r="http://schemas.openxmlformats.org/officeDocument/2006/relationships" xmlns:p="http://schemas.openxmlformats.org/presentationml/2006/main">
   <p:cSld>
     <p:bg>

</xml_diff>